<commit_message>
Update today's problem with a bonus question
</commit_message>
<xml_diff>
--- a/2023/2023-04/2023-04-09/problem.pptx
+++ b/2023/2023-04/2023-04-09/problem.pptx
@@ -5923,7 +5923,29 @@
           <a:p>
             <a:r>
               <a:rPr lang="en-US" dirty="0"/>
-              <a:t>How many squares are there in the following image?</a:t>
+              <a:t>How many squares are there in the following 3x3 grid?</a:t>
+            </a:r>
+          </a:p>
+          <a:p>
+            <a:endParaRPr lang="en-US" dirty="0"/>
+          </a:p>
+          <a:p>
+            <a:endParaRPr lang="en-US" dirty="0"/>
+          </a:p>
+          <a:p>
+            <a:endParaRPr lang="en-US" dirty="0"/>
+          </a:p>
+          <a:p>
+            <a:r>
+              <a:rPr lang="en-US" dirty="0"/>
+              <a:t>Bonus question: how many squares are there in a 8x8 grid?</a:t>
+            </a:r>
+          </a:p>
+          <a:p>
+            <a:pPr lvl="1"/>
+            <a:r>
+              <a:rPr lang="en-US" dirty="0"/>
+              <a:t>Hint: look for number patterns in 3x3 grid.</a:t>
             </a:r>
           </a:p>
         </p:txBody>
@@ -5942,8 +5964,8 @@
         </p:nvGrpSpPr>
         <p:grpSpPr>
           <a:xfrm>
-            <a:off x="3364302" y="3429000"/>
-            <a:ext cx="1817298" cy="1817298"/>
+            <a:off x="2898475" y="3092570"/>
+            <a:ext cx="1099868" cy="1099868"/>
             <a:chOff x="3364302" y="3429000"/>
             <a:chExt cx="2731698" cy="2731698"/>
           </a:xfrm>

</xml_diff>